<commit_message>
added slides for sections 1-5
</commit_message>
<xml_diff>
--- a/data/section 2/2_Building_your_first_website.pptx
+++ b/data/section 2/2_Building_your_first_website.pptx
@@ -1721,8 +1721,8 @@
   </pc:docChgLst>
   <pc:docChgLst>
     <pc:chgData name="Dénes CSALA" userId="f3f680a857a6f265" providerId="LiveId" clId="{6BB35AEB-89C8-4E2D-A49F-178E29F98E01}"/>
-    <pc:docChg chg="delSld delMainMaster modSection">
-      <pc:chgData name="Dénes CSALA" userId="f3f680a857a6f265" providerId="LiveId" clId="{6BB35AEB-89C8-4E2D-A49F-178E29F98E01}" dt="2024-01-31T10:28:10.802" v="0" actId="47"/>
+    <pc:docChg chg="custSel delSld modSld delMainMaster modSection">
+      <pc:chgData name="Dénes CSALA" userId="f3f680a857a6f265" providerId="LiveId" clId="{6BB35AEB-89C8-4E2D-A49F-178E29F98E01}" dt="2024-01-31T10:48:47.051" v="32" actId="20577"/>
       <pc:docMkLst>
         <pc:docMk/>
       </pc:docMkLst>
@@ -1901,6 +1901,21 @@
           <pc:sldMk cId="3746984205" sldId="483"/>
         </pc:sldMkLst>
       </pc:sldChg>
+      <pc:sldChg chg="modSp mod">
+        <pc:chgData name="Dénes CSALA" userId="f3f680a857a6f265" providerId="LiveId" clId="{6BB35AEB-89C8-4E2D-A49F-178E29F98E01}" dt="2024-01-31T10:47:28.308" v="2" actId="20577"/>
+        <pc:sldMkLst>
+          <pc:docMk/>
+          <pc:sldMk cId="1374648882" sldId="486"/>
+        </pc:sldMkLst>
+        <pc:spChg chg="mod">
+          <ac:chgData name="Dénes CSALA" userId="f3f680a857a6f265" providerId="LiveId" clId="{6BB35AEB-89C8-4E2D-A49F-178E29F98E01}" dt="2024-01-31T10:47:28.308" v="2" actId="20577"/>
+          <ac:spMkLst>
+            <pc:docMk/>
+            <pc:sldMk cId="1374648882" sldId="486"/>
+            <ac:spMk id="2" creationId="{FC4383FA-EEB7-47D9-935D-7234D206AD1E}"/>
+          </ac:spMkLst>
+        </pc:spChg>
+      </pc:sldChg>
       <pc:sldChg chg="del">
         <pc:chgData name="Dénes CSALA" userId="f3f680a857a6f265" providerId="LiveId" clId="{6BB35AEB-89C8-4E2D-A49F-178E29F98E01}" dt="2024-01-31T10:28:10.802" v="0" actId="47"/>
         <pc:sldMkLst>
@@ -1971,12 +1986,42 @@
           <pc:sldMk cId="924339747" sldId="510"/>
         </pc:sldMkLst>
       </pc:sldChg>
+      <pc:sldChg chg="modSp mod">
+        <pc:chgData name="Dénes CSALA" userId="f3f680a857a6f265" providerId="LiveId" clId="{6BB35AEB-89C8-4E2D-A49F-178E29F98E01}" dt="2024-01-31T10:47:31.341" v="4" actId="20577"/>
+        <pc:sldMkLst>
+          <pc:docMk/>
+          <pc:sldMk cId="1643953318" sldId="512"/>
+        </pc:sldMkLst>
+        <pc:spChg chg="mod">
+          <ac:chgData name="Dénes CSALA" userId="f3f680a857a6f265" providerId="LiveId" clId="{6BB35AEB-89C8-4E2D-A49F-178E29F98E01}" dt="2024-01-31T10:47:31.341" v="4" actId="20577"/>
+          <ac:spMkLst>
+            <pc:docMk/>
+            <pc:sldMk cId="1643953318" sldId="512"/>
+            <ac:spMk id="2" creationId="{FC4383FA-EEB7-47D9-935D-7234D206AD1E}"/>
+          </ac:spMkLst>
+        </pc:spChg>
+      </pc:sldChg>
       <pc:sldChg chg="del">
         <pc:chgData name="Dénes CSALA" userId="f3f680a857a6f265" providerId="LiveId" clId="{6BB35AEB-89C8-4E2D-A49F-178E29F98E01}" dt="2024-01-31T10:28:10.802" v="0" actId="47"/>
         <pc:sldMkLst>
           <pc:docMk/>
           <pc:sldMk cId="1335822625" sldId="513"/>
         </pc:sldMkLst>
+      </pc:sldChg>
+      <pc:sldChg chg="modSp mod">
+        <pc:chgData name="Dénes CSALA" userId="f3f680a857a6f265" providerId="LiveId" clId="{6BB35AEB-89C8-4E2D-A49F-178E29F98E01}" dt="2024-01-31T10:48:47.051" v="32" actId="20577"/>
+        <pc:sldMkLst>
+          <pc:docMk/>
+          <pc:sldMk cId="1599196781" sldId="516"/>
+        </pc:sldMkLst>
+        <pc:spChg chg="mod">
+          <ac:chgData name="Dénes CSALA" userId="f3f680a857a6f265" providerId="LiveId" clId="{6BB35AEB-89C8-4E2D-A49F-178E29F98E01}" dt="2024-01-31T10:48:47.051" v="32" actId="20577"/>
+          <ac:spMkLst>
+            <pc:docMk/>
+            <pc:sldMk cId="1599196781" sldId="516"/>
+            <ac:spMk id="2" creationId="{0FEE2FE8-D24E-41DE-AA78-81A6ECA35759}"/>
+          </ac:spMkLst>
+        </pc:spChg>
       </pc:sldChg>
       <pc:sldMasterChg chg="del delSldLayout">
         <pc:chgData name="Dénes CSALA" userId="f3f680a857a6f265" providerId="LiveId" clId="{6BB35AEB-89C8-4E2D-A49F-178E29F98E01}" dt="2024-01-31T10:28:10.802" v="0" actId="47"/>
@@ -11939,7 +11984,7 @@
                 <a:latin typeface="Circular Std Book" panose="020B0604020101020102" pitchFamily="34" charset="0"/>
                 <a:cs typeface="Circular Std Book" panose="020B0604020101020102" pitchFamily="34" charset="0"/>
               </a:rPr>
-              <a:t>CSS</a:t>
+              <a:t>CSS – updated to 3-tier format</a:t>
             </a:r>
             <a:r>
               <a:rPr lang="en-GB" sz="5400" dirty="0">
@@ -12342,7 +12387,7 @@
                 <a:latin typeface="Circular Std Book" panose="020B0604020101020102" pitchFamily="34" charset="0"/>
                 <a:cs typeface="Circular Std Book" panose="020B0604020101020102" pitchFamily="34" charset="0"/>
               </a:rPr>
-              <a:t>Session 1</a:t>
+              <a:t>Session 2</a:t>
             </a:r>
             <a:r>
               <a:rPr lang="en-GB" dirty="0">
@@ -12530,7 +12575,7 @@
                 <a:latin typeface="Circular Std Book" panose="020B0604020101020102" pitchFamily="34" charset="0"/>
                 <a:cs typeface="Circular Std Book" panose="020B0604020101020102" pitchFamily="34" charset="0"/>
               </a:rPr>
-              <a:t>Session 1</a:t>
+              <a:t>Session 2</a:t>
             </a:r>
             <a:r>
               <a:rPr lang="en-GB" dirty="0">

</xml_diff>